<commit_message>
Update day 1 slides
</commit_message>
<xml_diff>
--- a/slides/day 1/D1C2_LR_introANNs.pptx
+++ b/slides/day 1/D1C2_LR_introANNs.pptx
@@ -223,7 +223,7 @@
           <a:p>
             <a:fld id="{FF5685EE-3D40-0A4E-BB88-46887330FC0A}" type="datetimeFigureOut">
               <a:rPr lang="en-US" smtClean="0"/>
-              <a:t>10/5/2025</a:t>
+              <a:t>10/6/2025</a:t>
             </a:fld>
             <a:endParaRPr lang="en-US"/>
           </a:p>
@@ -768,7 +768,7 @@
             <a:fld id="{16F2FB5F-D553-C945-B874-A642CC0C851F}" type="datetime3">
               <a:rPr lang="en-IE" smtClean="0"/>
               <a:pPr/>
-              <a:t>5 October 2025</a:t>
+              <a:t>6 October 2025</a:t>
             </a:fld>
             <a:endParaRPr lang="en-US" dirty="0"/>
           </a:p>
@@ -1639,7 +1639,7 @@
             <a:fld id="{16F2FB5F-D553-C945-B874-A642CC0C851F}" type="datetime3">
               <a:rPr lang="en-IE" smtClean="0"/>
               <a:pPr/>
-              <a:t>5 October 2025</a:t>
+              <a:t>6 October 2025</a:t>
             </a:fld>
             <a:endParaRPr lang="en-US" dirty="0"/>
           </a:p>
@@ -1851,7 +1851,7 @@
             <a:fld id="{16F2FB5F-D553-C945-B874-A642CC0C851F}" type="datetime3">
               <a:rPr lang="en-IE" smtClean="0"/>
               <a:pPr/>
-              <a:t>5 October 2025</a:t>
+              <a:t>6 October 2025</a:t>
             </a:fld>
             <a:endParaRPr lang="en-US" dirty="0"/>
           </a:p>
@@ -2026,7 +2026,7 @@
           <a:p>
             <a:fld id="{BEF41344-4D35-F145-B477-F6239A2130EE}" type="datetime3">
               <a:rPr lang="en-IE" smtClean="0"/>
-              <a:t>5 October 2025</a:t>
+              <a:t>6 October 2025</a:t>
             </a:fld>
             <a:endParaRPr lang="en-US"/>
           </a:p>
@@ -2302,7 +2302,7 @@
           <a:p>
             <a:fld id="{07196900-CA2A-2D43-9641-C5C0DD2D22D3}" type="datetime3">
               <a:rPr lang="en-IE" smtClean="0"/>
-              <a:t>5 October 2025</a:t>
+              <a:t>6 October 2025</a:t>
             </a:fld>
             <a:endParaRPr lang="en-US"/>
           </a:p>
@@ -2570,7 +2570,7 @@
           <a:p>
             <a:fld id="{8AB1A910-F8E0-D541-83F2-2CFD6E718762}" type="datetime3">
               <a:rPr lang="en-IE" smtClean="0"/>
-              <a:t>5 October 2025</a:t>
+              <a:t>6 October 2025</a:t>
             </a:fld>
             <a:endParaRPr lang="en-US"/>
           </a:p>
@@ -2712,7 +2712,7 @@
           <a:p>
             <a:fld id="{7E245B59-D3F3-5B43-BDD1-6C7B7CFD2AA6}" type="datetime3">
               <a:rPr lang="en-IE" smtClean="0"/>
-              <a:t>5 October 2025</a:t>
+              <a:t>6 October 2025</a:t>
             </a:fld>
             <a:endParaRPr lang="en-US"/>
           </a:p>
@@ -2825,7 +2825,7 @@
           <a:p>
             <a:fld id="{AD77DDCF-3644-8C44-AE36-2C59F897E125}" type="datetime3">
               <a:rPr lang="en-IE" smtClean="0"/>
-              <a:t>5 October 2025</a:t>
+              <a:t>6 October 2025</a:t>
             </a:fld>
             <a:endParaRPr lang="en-US"/>
           </a:p>
@@ -3236,7 +3236,7 @@
           <a:p>
             <a:fld id="{C1B28D5F-B017-3B47-9775-DA319F6143FF}" type="datetime3">
               <a:rPr lang="en-IE" smtClean="0"/>
-              <a:t>5 October 2025</a:t>
+              <a:t>6 October 2025</a:t>
             </a:fld>
             <a:endParaRPr lang="en-US" dirty="0"/>
           </a:p>
@@ -11171,15 +11171,15 @@
             </a:pPr>
             <a:r>
               <a:rPr lang="en-US" dirty="0"/>
-              <a:t>Prepare a short (5 minute) group presentation on one aspect you found interesting that’s </a:t>
+              <a:t>Prepare a short (5 minute) and simple group presentation that </a:t>
             </a:r>
             <a:r>
-              <a:rPr lang="en-US" b="1" dirty="0"/>
-              <a:t>not</a:t>
+              <a:rPr lang="en-US" dirty="0" err="1"/>
+              <a:t>summarises</a:t>
             </a:r>
             <a:r>
               <a:rPr lang="en-US" dirty="0"/>
-              <a:t> about the neural networks they used</a:t>
+              <a:t> the paper. All members of group must present.</a:t>
             </a:r>
           </a:p>
           <a:p>
@@ -11276,8 +11276,8 @@
           </a:p>
         </p:txBody>
       </p:sp>
-      <mc:AlternateContent xmlns:mc="http://schemas.openxmlformats.org/markup-compatibility/2006">
-        <mc:Choice xmlns:a14="http://schemas.microsoft.com/office/drawing/2010/main" Requires="a14">
+      <mc:AlternateContent xmlns:mc="http://schemas.openxmlformats.org/markup-compatibility/2006" xmlns:a14="http://schemas.microsoft.com/office/drawing/2010/main">
+        <mc:Choice Requires="a14">
           <p:sp>
             <p:nvSpPr>
               <p:cNvPr id="3" name="Content Placeholder 2">
@@ -11396,7 +11396,7 @@
             </p:txBody>
           </p:sp>
         </mc:Choice>
-        <mc:Fallback>
+        <mc:Fallback xmlns="">
           <p:sp>
             <p:nvSpPr>
               <p:cNvPr id="3" name="Content Placeholder 2">
@@ -13298,8 +13298,8 @@
           </a:p>
         </p:txBody>
       </p:sp>
-      <mc:AlternateContent xmlns:mc="http://schemas.openxmlformats.org/markup-compatibility/2006">
-        <mc:Choice xmlns:a14="http://schemas.microsoft.com/office/drawing/2010/main" Requires="a14">
+      <mc:AlternateContent xmlns:mc="http://schemas.openxmlformats.org/markup-compatibility/2006" xmlns:a14="http://schemas.microsoft.com/office/drawing/2010/main">
+        <mc:Choice Requires="a14">
           <p:sp>
             <p:nvSpPr>
               <p:cNvPr id="3" name="Content Placeholder 2">
@@ -13658,7 +13658,7 @@
             </p:txBody>
           </p:sp>
         </mc:Choice>
-        <mc:Fallback>
+        <mc:Fallback xmlns="">
           <p:sp>
             <p:nvSpPr>
               <p:cNvPr id="3" name="Content Placeholder 2">

</xml_diff>